<commit_message>
Ajustes finales a la presentacion y correciones al analisis
</commit_message>
<xml_diff>
--- a/CloudLocation/CloudLocation-Presentacion.pptx
+++ b/CloudLocation/CloudLocation-Presentacion.pptx
@@ -6,17 +6,18 @@
     <p:sldMasterId id="2147483708" r:id="rId2"/>
   </p:sldMasterIdLst>
   <p:notesMasterIdLst>
-    <p:notesMasterId r:id="rId11"/>
+    <p:notesMasterId r:id="rId12"/>
   </p:notesMasterIdLst>
   <p:sldIdLst>
     <p:sldId id="257" r:id="rId3"/>
     <p:sldId id="258" r:id="rId4"/>
     <p:sldId id="260" r:id="rId5"/>
     <p:sldId id="265" r:id="rId6"/>
-    <p:sldId id="262" r:id="rId7"/>
+    <p:sldId id="266" r:id="rId7"/>
     <p:sldId id="263" r:id="rId8"/>
-    <p:sldId id="264" r:id="rId9"/>
-    <p:sldId id="261" r:id="rId10"/>
+    <p:sldId id="267" r:id="rId9"/>
+    <p:sldId id="268" r:id="rId10"/>
+    <p:sldId id="261" r:id="rId11"/>
   </p:sldIdLst>
   <p:sldSz cx="12192000" cy="6858000"/>
   <p:notesSz cx="6858000" cy="9144000"/>
@@ -854,27 +855,98 @@
           <a:p>
             <a:r>
               <a:rPr lang="es-CO" dirty="0"/>
-              <a:t>https://www.iconfinder.com/iconsets/artificial-intelligence-6</a:t>
-            </a:r>
-          </a:p>
-          <a:p>
-            <a:endParaRPr lang="es-CO" dirty="0"/>
-          </a:p>
-          <a:p>
+              <a:t>La salida de red es la </a:t>
+            </a:r>
+            <a:r>
+              <a:rPr lang="es-CO" dirty="0" err="1"/>
+              <a:t>metrica</a:t>
+            </a:r>
             <a:r>
               <a:rPr lang="es-CO" dirty="0"/>
-              <a:t>https://www.iconfinder.com/iconsets/free-simple-line-mix</a:t>
-            </a:r>
-          </a:p>
-          <a:p>
-            <a:endParaRPr lang="es-CO" dirty="0"/>
-          </a:p>
-          <a:p>
-            <a:r>
-              <a:rPr lang="es-CO" dirty="0"/>
-              <a:t>https://www.iconfinder.com/computer-hardware-icons?price=free</a:t>
-            </a:r>
-          </a:p>
+              <a:t> que permite mejores comparaciones, pues es una muestra fiel del uso del software, la concurrencia de los usuarios y el peso de las peticiones.</a:t>
+            </a:r>
+          </a:p>
+        </p:txBody>
+      </p:sp>
+      <p:sp>
+        <p:nvSpPr>
+          <p:cNvPr id="4" name="Slide Number Placeholder 3"/>
+          <p:cNvSpPr>
+            <a:spLocks noGrp="1"/>
+          </p:cNvSpPr>
+          <p:nvPr>
+            <p:ph type="sldNum" sz="quarter" idx="5"/>
+          </p:nvPr>
+        </p:nvSpPr>
+        <p:spPr/>
+        <p:txBody>
+          <a:bodyPr/>
+          <a:lstStyle/>
+          <a:p>
+            <a:fld id="{CA22563D-3A1D-4371-89B0-96CEA25D1055}" type="slidenum">
+              <a:rPr lang="es-CO" smtClean="0"/>
+              <a:t>5</a:t>
+            </a:fld>
+            <a:endParaRPr lang="es-CO"/>
+          </a:p>
+        </p:txBody>
+      </p:sp>
+    </p:spTree>
+    <p:extLst>
+      <p:ext uri="{BB962C8B-B14F-4D97-AF65-F5344CB8AC3E}">
+        <p14:creationId xmlns:p14="http://schemas.microsoft.com/office/powerpoint/2010/main" val="1220417729"/>
+      </p:ext>
+    </p:extLst>
+  </p:cSld>
+  <p:clrMapOvr>
+    <a:masterClrMapping/>
+  </p:clrMapOvr>
+</p:notes>
+</file>
+
+<file path=ppt/notesSlides/notesSlide5.xml><?xml version="1.0" encoding="utf-8"?>
+<p:notes xmlns:a="http://schemas.openxmlformats.org/drawingml/2006/main" xmlns:r="http://schemas.openxmlformats.org/officeDocument/2006/relationships" xmlns:p="http://schemas.openxmlformats.org/presentationml/2006/main">
+  <p:cSld>
+    <p:spTree>
+      <p:nvGrpSpPr>
+        <p:cNvPr id="1" name=""/>
+        <p:cNvGrpSpPr/>
+        <p:nvPr/>
+      </p:nvGrpSpPr>
+      <p:grpSpPr>
+        <a:xfrm>
+          <a:off x="0" y="0"/>
+          <a:ext cx="0" cy="0"/>
+          <a:chOff x="0" y="0"/>
+          <a:chExt cx="0" cy="0"/>
+        </a:xfrm>
+      </p:grpSpPr>
+      <p:sp>
+        <p:nvSpPr>
+          <p:cNvPr id="2" name="Slide Image Placeholder 1"/>
+          <p:cNvSpPr>
+            <a:spLocks noGrp="1" noRot="1" noChangeAspect="1"/>
+          </p:cNvSpPr>
+          <p:nvPr>
+            <p:ph type="sldImg"/>
+          </p:nvPr>
+        </p:nvSpPr>
+        <p:spPr/>
+      </p:sp>
+      <p:sp>
+        <p:nvSpPr>
+          <p:cNvPr id="3" name="Notes Placeholder 2"/>
+          <p:cNvSpPr>
+            <a:spLocks noGrp="1"/>
+          </p:cNvSpPr>
+          <p:nvPr>
+            <p:ph type="body" idx="1"/>
+          </p:nvPr>
+        </p:nvSpPr>
+        <p:spPr/>
+        <p:txBody>
+          <a:bodyPr/>
+          <a:lstStyle/>
           <a:p>
             <a:endParaRPr lang="es-CO" dirty="0"/>
           </a:p>
@@ -907,6 +979,174 @@
     <p:extLst>
       <p:ext uri="{BB962C8B-B14F-4D97-AF65-F5344CB8AC3E}">
         <p14:creationId xmlns:p14="http://schemas.microsoft.com/office/powerpoint/2010/main" val="1094543491"/>
+      </p:ext>
+    </p:extLst>
+  </p:cSld>
+  <p:clrMapOvr>
+    <a:masterClrMapping/>
+  </p:clrMapOvr>
+</p:notes>
+</file>
+
+<file path=ppt/notesSlides/notesSlide6.xml><?xml version="1.0" encoding="utf-8"?>
+<p:notes xmlns:a="http://schemas.openxmlformats.org/drawingml/2006/main" xmlns:r="http://schemas.openxmlformats.org/officeDocument/2006/relationships" xmlns:p="http://schemas.openxmlformats.org/presentationml/2006/main">
+  <p:cSld>
+    <p:spTree>
+      <p:nvGrpSpPr>
+        <p:cNvPr id="1" name=""/>
+        <p:cNvGrpSpPr/>
+        <p:nvPr/>
+      </p:nvGrpSpPr>
+      <p:grpSpPr>
+        <a:xfrm>
+          <a:off x="0" y="0"/>
+          <a:ext cx="0" cy="0"/>
+          <a:chOff x="0" y="0"/>
+          <a:chExt cx="0" cy="0"/>
+        </a:xfrm>
+      </p:grpSpPr>
+      <p:sp>
+        <p:nvSpPr>
+          <p:cNvPr id="2" name="Slide Image Placeholder 1"/>
+          <p:cNvSpPr>
+            <a:spLocks noGrp="1" noRot="1" noChangeAspect="1"/>
+          </p:cNvSpPr>
+          <p:nvPr>
+            <p:ph type="sldImg"/>
+          </p:nvPr>
+        </p:nvSpPr>
+        <p:spPr/>
+      </p:sp>
+      <p:sp>
+        <p:nvSpPr>
+          <p:cNvPr id="3" name="Notes Placeholder 2"/>
+          <p:cNvSpPr>
+            <a:spLocks noGrp="1"/>
+          </p:cNvSpPr>
+          <p:nvPr>
+            <p:ph type="body" idx="1"/>
+          </p:nvPr>
+        </p:nvSpPr>
+        <p:spPr/>
+        <p:txBody>
+          <a:bodyPr/>
+          <a:lstStyle/>
+          <a:p>
+            <a:endParaRPr lang="es-CO" dirty="0"/>
+          </a:p>
+        </p:txBody>
+      </p:sp>
+      <p:sp>
+        <p:nvSpPr>
+          <p:cNvPr id="4" name="Slide Number Placeholder 3"/>
+          <p:cNvSpPr>
+            <a:spLocks noGrp="1"/>
+          </p:cNvSpPr>
+          <p:nvPr>
+            <p:ph type="sldNum" sz="quarter" idx="5"/>
+          </p:nvPr>
+        </p:nvSpPr>
+        <p:spPr/>
+        <p:txBody>
+          <a:bodyPr/>
+          <a:lstStyle/>
+          <a:p>
+            <a:fld id="{CA22563D-3A1D-4371-89B0-96CEA25D1055}" type="slidenum">
+              <a:rPr lang="es-CO" smtClean="0"/>
+              <a:t>7</a:t>
+            </a:fld>
+            <a:endParaRPr lang="es-CO"/>
+          </a:p>
+        </p:txBody>
+      </p:sp>
+    </p:spTree>
+    <p:extLst>
+      <p:ext uri="{BB962C8B-B14F-4D97-AF65-F5344CB8AC3E}">
+        <p14:creationId xmlns:p14="http://schemas.microsoft.com/office/powerpoint/2010/main" val="2712669985"/>
+      </p:ext>
+    </p:extLst>
+  </p:cSld>
+  <p:clrMapOvr>
+    <a:masterClrMapping/>
+  </p:clrMapOvr>
+</p:notes>
+</file>
+
+<file path=ppt/notesSlides/notesSlide7.xml><?xml version="1.0" encoding="utf-8"?>
+<p:notes xmlns:a="http://schemas.openxmlformats.org/drawingml/2006/main" xmlns:r="http://schemas.openxmlformats.org/officeDocument/2006/relationships" xmlns:p="http://schemas.openxmlformats.org/presentationml/2006/main">
+  <p:cSld>
+    <p:spTree>
+      <p:nvGrpSpPr>
+        <p:cNvPr id="1" name=""/>
+        <p:cNvGrpSpPr/>
+        <p:nvPr/>
+      </p:nvGrpSpPr>
+      <p:grpSpPr>
+        <a:xfrm>
+          <a:off x="0" y="0"/>
+          <a:ext cx="0" cy="0"/>
+          <a:chOff x="0" y="0"/>
+          <a:chExt cx="0" cy="0"/>
+        </a:xfrm>
+      </p:grpSpPr>
+      <p:sp>
+        <p:nvSpPr>
+          <p:cNvPr id="2" name="Slide Image Placeholder 1"/>
+          <p:cNvSpPr>
+            <a:spLocks noGrp="1" noRot="1" noChangeAspect="1"/>
+          </p:cNvSpPr>
+          <p:nvPr>
+            <p:ph type="sldImg"/>
+          </p:nvPr>
+        </p:nvSpPr>
+        <p:spPr/>
+      </p:sp>
+      <p:sp>
+        <p:nvSpPr>
+          <p:cNvPr id="3" name="Notes Placeholder 2"/>
+          <p:cNvSpPr>
+            <a:spLocks noGrp="1"/>
+          </p:cNvSpPr>
+          <p:nvPr>
+            <p:ph type="body" idx="1"/>
+          </p:nvPr>
+        </p:nvSpPr>
+        <p:spPr/>
+        <p:txBody>
+          <a:bodyPr/>
+          <a:lstStyle/>
+          <a:p>
+            <a:endParaRPr lang="es-CO" dirty="0"/>
+          </a:p>
+        </p:txBody>
+      </p:sp>
+      <p:sp>
+        <p:nvSpPr>
+          <p:cNvPr id="4" name="Slide Number Placeholder 3"/>
+          <p:cNvSpPr>
+            <a:spLocks noGrp="1"/>
+          </p:cNvSpPr>
+          <p:nvPr>
+            <p:ph type="sldNum" sz="quarter" idx="5"/>
+          </p:nvPr>
+        </p:nvSpPr>
+        <p:spPr/>
+        <p:txBody>
+          <a:bodyPr/>
+          <a:lstStyle/>
+          <a:p>
+            <a:fld id="{CA22563D-3A1D-4371-89B0-96CEA25D1055}" type="slidenum">
+              <a:rPr lang="es-CO" smtClean="0"/>
+              <a:t>8</a:t>
+            </a:fld>
+            <a:endParaRPr lang="es-CO"/>
+          </a:p>
+        </p:txBody>
+      </p:sp>
+    </p:spTree>
+    <p:extLst>
+      <p:ext uri="{BB962C8B-B14F-4D97-AF65-F5344CB8AC3E}">
+        <p14:creationId xmlns:p14="http://schemas.microsoft.com/office/powerpoint/2010/main" val="2498111149"/>
       </p:ext>
     </p:extLst>
   </p:cSld>
@@ -11308,7 +11548,7 @@
         </p:nvSpPr>
         <p:spPr>
           <a:xfrm>
-            <a:off x="8191925" y="1325880"/>
+            <a:off x="8212075" y="1552846"/>
             <a:ext cx="3352375" cy="3066507"/>
           </a:xfrm>
           <a:prstGeom prst="ellipse">
@@ -11321,13 +11561,13 @@
           </a:bodyPr>
           <a:lstStyle/>
           <a:p>
-            <a:pPr>
+            <a:pPr algn="ctr">
               <a:lnSpc>
                 <a:spcPct val="90000"/>
               </a:lnSpc>
             </a:pPr>
             <a:r>
-              <a:rPr lang="en-US" sz="5000" b="0" i="0" kern="1200">
+              <a:rPr lang="en-US" sz="5000" b="0" i="0" kern="1200" dirty="0">
                 <a:solidFill>
                   <a:schemeClr val="tx2"/>
                 </a:solidFill>
@@ -11335,8 +11575,27 @@
                 <a:ea typeface="+mj-ea"/>
                 <a:cs typeface="+mj-cs"/>
               </a:rPr>
-              <a:t>Fuente de Datos</a:t>
-            </a:r>
+              <a:t>Fuente de </a:t>
+            </a:r>
+            <a:r>
+              <a:rPr lang="en-US" sz="5000" b="0" i="0" kern="1200" dirty="0" err="1">
+                <a:solidFill>
+                  <a:schemeClr val="tx2"/>
+                </a:solidFill>
+                <a:latin typeface="+mj-lt"/>
+                <a:ea typeface="+mj-ea"/>
+                <a:cs typeface="+mj-cs"/>
+              </a:rPr>
+              <a:t>Datos</a:t>
+            </a:r>
+            <a:endParaRPr lang="en-US" sz="5000" b="0" i="0" kern="1200" dirty="0">
+              <a:solidFill>
+                <a:schemeClr val="tx2"/>
+              </a:solidFill>
+              <a:latin typeface="+mj-lt"/>
+              <a:ea typeface="+mj-ea"/>
+              <a:cs typeface="+mj-cs"/>
+            </a:endParaRPr>
           </a:p>
         </p:txBody>
       </p:sp>
@@ -11956,37 +12215,6 @@
           </a:ln>
         </p:spPr>
       </p:sp>
-      <p:pic>
-        <p:nvPicPr>
-          <p:cNvPr id="4" name="Picture 3">
-            <a:extLst>
-              <a:ext uri="{FF2B5EF4-FFF2-40B4-BE49-F238E27FC236}">
-                <a16:creationId xmlns:a16="http://schemas.microsoft.com/office/drawing/2014/main" id="{78C37229-B5D2-4278-B2C0-60E3717396B7}"/>
-              </a:ext>
-            </a:extLst>
-          </p:cNvPr>
-          <p:cNvPicPr>
-            <a:picLocks noChangeAspect="1"/>
-          </p:cNvPicPr>
-          <p:nvPr/>
-        </p:nvPicPr>
-        <p:blipFill>
-          <a:blip r:embed="rId8"/>
-          <a:stretch>
-            <a:fillRect/>
-          </a:stretch>
-        </p:blipFill>
-        <p:spPr>
-          <a:xfrm>
-            <a:off x="425420" y="1204967"/>
-            <a:ext cx="6761113" cy="2558921"/>
-          </a:xfrm>
-          <a:prstGeom prst="rect">
-            <a:avLst/>
-          </a:prstGeom>
-          <a:effectLst/>
-        </p:spPr>
-      </p:pic>
       <p:sp>
         <p:nvSpPr>
           <p:cNvPr id="5" name="TextBox 4">
@@ -12080,7 +12308,7 @@
           <p:nvPr/>
         </p:nvPicPr>
         <p:blipFill>
-          <a:blip r:embed="rId9">
+          <a:blip r:embed="rId8">
             <a:duotone>
               <a:schemeClr val="accent5">
                 <a:shade val="45000"/>
@@ -12123,7 +12351,7 @@
           <p:nvPr/>
         </p:nvPicPr>
         <p:blipFill>
-          <a:blip r:embed="rId10">
+          <a:blip r:embed="rId9">
             <a:duotone>
               <a:schemeClr val="accent5">
                 <a:shade val="45000"/>
@@ -12166,7 +12394,7 @@
           <p:nvPr/>
         </p:nvPicPr>
         <p:blipFill>
-          <a:blip r:embed="rId11">
+          <a:blip r:embed="rId10">
             <a:duotone>
               <a:schemeClr val="accent5">
                 <a:shade val="45000"/>
@@ -12313,6 +12541,36 @@
           </a:p>
         </p:txBody>
       </p:sp>
+      <p:pic>
+        <p:nvPicPr>
+          <p:cNvPr id="3" name="Picture 2">
+            <a:extLst>
+              <a:ext uri="{FF2B5EF4-FFF2-40B4-BE49-F238E27FC236}">
+                <a16:creationId xmlns:a16="http://schemas.microsoft.com/office/drawing/2014/main" id="{21FD88B6-77EC-4885-936F-13EBFD895E5A}"/>
+              </a:ext>
+            </a:extLst>
+          </p:cNvPr>
+          <p:cNvPicPr>
+            <a:picLocks noChangeAspect="1"/>
+          </p:cNvPicPr>
+          <p:nvPr/>
+        </p:nvPicPr>
+        <p:blipFill>
+          <a:blip r:embed="rId11"/>
+          <a:stretch>
+            <a:fillRect/>
+          </a:stretch>
+        </p:blipFill>
+        <p:spPr>
+          <a:xfrm>
+            <a:off x="444629" y="1196761"/>
+            <a:ext cx="6713802" cy="2903472"/>
+          </a:xfrm>
+          <a:prstGeom prst="rect">
+            <a:avLst/>
+          </a:prstGeom>
+        </p:spPr>
+      </p:pic>
     </p:spTree>
     <p:extLst>
       <p:ext uri="{BB962C8B-B14F-4D97-AF65-F5344CB8AC3E}">
@@ -12343,36 +12601,6 @@
           <a:chExt cx="0" cy="0"/>
         </a:xfrm>
       </p:grpSpPr>
-      <p:pic>
-        <p:nvPicPr>
-          <p:cNvPr id="2" name="Picture 1">
-            <a:extLst>
-              <a:ext uri="{FF2B5EF4-FFF2-40B4-BE49-F238E27FC236}">
-                <a16:creationId xmlns:a16="http://schemas.microsoft.com/office/drawing/2014/main" id="{A5FDA431-70F7-457B-BB63-BD3421E4D4A6}"/>
-              </a:ext>
-            </a:extLst>
-          </p:cNvPr>
-          <p:cNvPicPr>
-            <a:picLocks noChangeAspect="1"/>
-          </p:cNvPicPr>
-          <p:nvPr/>
-        </p:nvPicPr>
-        <p:blipFill>
-          <a:blip r:embed="rId3"/>
-          <a:stretch>
-            <a:fillRect/>
-          </a:stretch>
-        </p:blipFill>
-        <p:spPr>
-          <a:xfrm>
-            <a:off x="179120" y="747112"/>
-            <a:ext cx="11833758" cy="4673973"/>
-          </a:xfrm>
-          <a:prstGeom prst="rect">
-            <a:avLst/>
-          </a:prstGeom>
-        </p:spPr>
-      </p:pic>
       <p:grpSp>
         <p:nvGrpSpPr>
           <p:cNvPr id="4" name="Group 3">
@@ -12487,7 +12715,7 @@
                     <a:srgbClr val="C00000"/>
                   </a:solidFill>
                 </a:rPr>
-                <a:t>PRIMER FRACASO:</a:t>
+                <a:t>FRACASO:</a:t>
               </a:r>
               <a:r>
                 <a:rPr lang="es-CO" b="1" dirty="0">
@@ -12696,13 +12924,8 @@
             <a:p>
               <a:r>
                 <a:rPr lang="es-CO" sz="1400" b="1" dirty="0"/>
-                <a:t>LM </a:t>
+                <a:t>LM</a:t>
               </a:r>
-              <a:r>
-                <a:rPr lang="en-US" sz="1400" b="1" dirty="0"/>
-                <a:t>[%CPU]</a:t>
-              </a:r>
-              <a:endParaRPr lang="es-CO" sz="1400" b="1" dirty="0"/>
             </a:p>
           </p:txBody>
         </p:sp>
@@ -12736,16 +12959,43 @@
             <a:p>
               <a:r>
                 <a:rPr lang="es-CO" sz="1400" b="1" dirty="0"/>
-                <a:t>CA </a:t>
+                <a:t>CA</a:t>
               </a:r>
-              <a:r>
-                <a:rPr lang="en-US" sz="1400" b="1" dirty="0"/>
-                <a:t>[%CPU]</a:t>
-              </a:r>
+              <a:endParaRPr lang="en-US" sz="1400" b="1" dirty="0"/>
             </a:p>
           </p:txBody>
         </p:sp>
       </p:grpSp>
+      <p:pic>
+        <p:nvPicPr>
+          <p:cNvPr id="6" name="Picture 5">
+            <a:extLst>
+              <a:ext uri="{FF2B5EF4-FFF2-40B4-BE49-F238E27FC236}">
+                <a16:creationId xmlns:a16="http://schemas.microsoft.com/office/drawing/2014/main" id="{003E190A-7602-48DB-9DC5-7799FD3A34EB}"/>
+              </a:ext>
+            </a:extLst>
+          </p:cNvPr>
+          <p:cNvPicPr>
+            <a:picLocks noChangeAspect="1"/>
+          </p:cNvPicPr>
+          <p:nvPr/>
+        </p:nvPicPr>
+        <p:blipFill>
+          <a:blip r:embed="rId3"/>
+          <a:stretch>
+            <a:fillRect/>
+          </a:stretch>
+        </p:blipFill>
+        <p:spPr>
+          <a:xfrm>
+            <a:off x="404523" y="784043"/>
+            <a:ext cx="11538617" cy="4685323"/>
+          </a:xfrm>
+          <a:prstGeom prst="rect">
+            <a:avLst/>
+          </a:prstGeom>
+        </p:spPr>
+      </p:pic>
     </p:spTree>
     <p:extLst>
       <p:ext uri="{BB962C8B-B14F-4D97-AF65-F5344CB8AC3E}">
@@ -12778,34 +13028,261 @@
       </p:grpSpPr>
       <p:sp>
         <p:nvSpPr>
-          <p:cNvPr id="2" name="Title 1">
+          <p:cNvPr id="5" name="TextBox 4">
             <a:extLst>
               <a:ext uri="{FF2B5EF4-FFF2-40B4-BE49-F238E27FC236}">
-                <a16:creationId xmlns:a16="http://schemas.microsoft.com/office/drawing/2014/main" id="{EC22165B-50EB-44EC-AA53-0EAB8F48CD4E}"/>
+                <a16:creationId xmlns:a16="http://schemas.microsoft.com/office/drawing/2014/main" id="{57833AC8-F667-4ADA-8F9C-BBAADF0DA6FC}"/>
               </a:ext>
             </a:extLst>
           </p:cNvPr>
-          <p:cNvSpPr>
-            <a:spLocks noGrp="1"/>
-          </p:cNvSpPr>
-          <p:nvPr>
-            <p:ph type="title"/>
-          </p:nvPr>
+          <p:cNvSpPr txBox="1"/>
+          <p:nvPr/>
         </p:nvSpPr>
         <p:spPr>
           <a:xfrm>
-            <a:off x="1514184" y="2110618"/>
-            <a:ext cx="8825657" cy="1915647"/>
+            <a:off x="4038600" y="229656"/>
+            <a:ext cx="4516493" cy="369332"/>
           </a:xfrm>
+          <a:prstGeom prst="rect">
+            <a:avLst/>
+          </a:prstGeom>
+          <a:noFill/>
         </p:spPr>
         <p:txBody>
-          <a:bodyPr/>
+          <a:bodyPr wrap="square" rtlCol="0">
+            <a:spAutoFit/>
+          </a:bodyPr>
           <a:lstStyle/>
           <a:p>
+            <a:r>
+              <a:rPr lang="en-US" b="1" dirty="0"/>
+              <a:t>Salida de red en MB </a:t>
+            </a:r>
+            <a:r>
+              <a:rPr lang="en-US" b="1" dirty="0" err="1"/>
+              <a:t>acumulados</a:t>
+            </a:r>
+            <a:r>
+              <a:rPr lang="en-US" b="1" dirty="0"/>
+              <a:t> </a:t>
+            </a:r>
+            <a:r>
+              <a:rPr lang="en-US" b="1" dirty="0" err="1"/>
+              <a:t>diariamente</a:t>
+            </a:r>
+            <a:endParaRPr lang="es-CO" b="1" dirty="0"/>
+          </a:p>
+        </p:txBody>
+      </p:sp>
+      <p:grpSp>
+        <p:nvGrpSpPr>
+          <p:cNvPr id="13" name="Group 12">
+            <a:extLst>
+              <a:ext uri="{FF2B5EF4-FFF2-40B4-BE49-F238E27FC236}">
+                <a16:creationId xmlns:a16="http://schemas.microsoft.com/office/drawing/2014/main" id="{E2494D2D-9A67-4908-940C-D5B98E79D500}"/>
+              </a:ext>
+            </a:extLst>
+          </p:cNvPr>
+          <p:cNvGrpSpPr/>
+          <p:nvPr/>
+        </p:nvGrpSpPr>
+        <p:grpSpPr>
+          <a:xfrm>
+            <a:off x="526247" y="5965611"/>
+            <a:ext cx="11382724" cy="668102"/>
+            <a:chOff x="2411184" y="6078230"/>
+            <a:chExt cx="7175408" cy="668102"/>
+          </a:xfrm>
+        </p:grpSpPr>
+        <p:sp>
+          <p:nvSpPr>
+            <p:cNvPr id="14" name="Rectangle 13">
+              <a:extLst>
+                <a:ext uri="{FF2B5EF4-FFF2-40B4-BE49-F238E27FC236}">
+                  <a16:creationId xmlns:a16="http://schemas.microsoft.com/office/drawing/2014/main" id="{39CE79B8-0015-42CA-A1B6-CE875E360D2E}"/>
+                </a:ext>
+              </a:extLst>
+            </p:cNvPr>
+            <p:cNvSpPr/>
+            <p:nvPr/>
+          </p:nvSpPr>
+          <p:spPr>
+            <a:xfrm>
+              <a:off x="2411184" y="6078230"/>
+              <a:ext cx="7175408" cy="662733"/>
+            </a:xfrm>
+            <a:prstGeom prst="rect">
+              <a:avLst/>
+            </a:prstGeom>
+            <a:solidFill>
+              <a:schemeClr val="accent6">
+                <a:lumMod val="20000"/>
+                <a:lumOff val="80000"/>
+              </a:schemeClr>
+            </a:solidFill>
+            <a:ln>
+              <a:noFill/>
+            </a:ln>
+          </p:spPr>
+          <p:style>
+            <a:lnRef idx="2">
+              <a:schemeClr val="accent1">
+                <a:shade val="50000"/>
+              </a:schemeClr>
+            </a:lnRef>
+            <a:fillRef idx="1">
+              <a:schemeClr val="accent1"/>
+            </a:fillRef>
+            <a:effectRef idx="0">
+              <a:schemeClr val="accent1"/>
+            </a:effectRef>
+            <a:fontRef idx="minor">
+              <a:schemeClr val="lt1"/>
+            </a:fontRef>
+          </p:style>
+          <p:txBody>
+            <a:bodyPr rtlCol="0" anchor="ctr"/>
+            <a:lstStyle/>
+            <a:p>
+              <a:pPr algn="ctr"/>
+              <a:endParaRPr lang="es-CO"/>
+            </a:p>
+          </p:txBody>
+        </p:sp>
+        <p:sp>
+          <p:nvSpPr>
+            <p:cNvPr id="20" name="TextBox 19">
+              <a:extLst>
+                <a:ext uri="{FF2B5EF4-FFF2-40B4-BE49-F238E27FC236}">
+                  <a16:creationId xmlns:a16="http://schemas.microsoft.com/office/drawing/2014/main" id="{63AFFBD2-8DAB-494C-9FC4-05D72D975ECF}"/>
+                </a:ext>
+              </a:extLst>
+            </p:cNvPr>
+            <p:cNvSpPr txBox="1"/>
+            <p:nvPr/>
+          </p:nvSpPr>
+          <p:spPr>
+            <a:xfrm>
+              <a:off x="2411184" y="6100001"/>
+              <a:ext cx="7175408" cy="646331"/>
+            </a:xfrm>
+            <a:prstGeom prst="rect">
+              <a:avLst/>
+            </a:prstGeom>
+            <a:noFill/>
+          </p:spPr>
+          <p:txBody>
+            <a:bodyPr wrap="square" rtlCol="0">
+              <a:spAutoFit/>
+            </a:bodyPr>
+            <a:lstStyle/>
+            <a:p>
+              <a:pPr>
+                <a:buClr>
+                  <a:srgbClr val="00B050"/>
+                </a:buClr>
+              </a:pPr>
+              <a:r>
+                <a:rPr lang="es-CO" b="1" dirty="0">
+                  <a:solidFill>
+                    <a:srgbClr val="00B050"/>
+                  </a:solidFill>
+                </a:rPr>
+                <a:t>HALLAZGO : </a:t>
+              </a:r>
+              <a:r>
+                <a:rPr lang="es-CO" dirty="0"/>
+                <a:t>Los datos de salida de red acumulados diariamente están fuertemente relacionados al uso REAL del software.</a:t>
+              </a:r>
+            </a:p>
+          </p:txBody>
+        </p:sp>
+      </p:grpSp>
+      <p:pic>
+        <p:nvPicPr>
+          <p:cNvPr id="9" name="Picture 8">
+            <a:extLst>
+              <a:ext uri="{FF2B5EF4-FFF2-40B4-BE49-F238E27FC236}">
+                <a16:creationId xmlns:a16="http://schemas.microsoft.com/office/drawing/2014/main" id="{F250AD45-D244-48CF-9E61-DB53FA2968DC}"/>
+              </a:ext>
+            </a:extLst>
+          </p:cNvPr>
+          <p:cNvPicPr>
+            <a:picLocks noChangeAspect="1"/>
+          </p:cNvPicPr>
+          <p:nvPr/>
+        </p:nvPicPr>
+        <p:blipFill>
+          <a:blip r:embed="rId3"/>
+          <a:stretch>
+            <a:fillRect/>
+          </a:stretch>
+        </p:blipFill>
+        <p:spPr>
+          <a:xfrm>
+            <a:off x="237427" y="687561"/>
+            <a:ext cx="11796255" cy="4777072"/>
+          </a:xfrm>
+          <a:prstGeom prst="rect">
+            <a:avLst/>
+          </a:prstGeom>
+        </p:spPr>
+      </p:pic>
+      <p:sp>
+        <p:nvSpPr>
+          <p:cNvPr id="25" name="Arrow: Pentagon 24">
+            <a:extLst>
+              <a:ext uri="{FF2B5EF4-FFF2-40B4-BE49-F238E27FC236}">
+                <a16:creationId xmlns:a16="http://schemas.microsoft.com/office/drawing/2014/main" id="{E6826C13-C072-4B40-835F-8B36934B8762}"/>
+              </a:ext>
+            </a:extLst>
+          </p:cNvPr>
+          <p:cNvSpPr/>
+          <p:nvPr/>
+        </p:nvSpPr>
+        <p:spPr>
+          <a:xfrm rot="16200000">
+            <a:off x="6519161" y="5227154"/>
+            <a:ext cx="700768" cy="259938"/>
+          </a:xfrm>
+          <a:prstGeom prst="homePlate">
+            <a:avLst>
+              <a:gd name="adj" fmla="val 103571"/>
+            </a:avLst>
+          </a:prstGeom>
+          <a:effectLst>
+            <a:glow rad="63500">
+              <a:schemeClr val="accent5">
+                <a:satMod val="175000"/>
+                <a:alpha val="40000"/>
+              </a:schemeClr>
+            </a:glow>
+          </a:effectLst>
+        </p:spPr>
+        <p:style>
+          <a:lnRef idx="2">
+            <a:schemeClr val="accent5">
+              <a:shade val="50000"/>
+            </a:schemeClr>
+          </a:lnRef>
+          <a:fillRef idx="1">
+            <a:schemeClr val="accent5"/>
+          </a:fillRef>
+          <a:effectRef idx="0">
+            <a:schemeClr val="accent5"/>
+          </a:effectRef>
+          <a:fontRef idx="minor">
+            <a:schemeClr val="lt1"/>
+          </a:fontRef>
+        </p:style>
+        <p:txBody>
+          <a:bodyPr rtlCol="0" anchor="ctr"/>
+          <a:lstStyle/>
+          <a:p>
             <a:pPr algn="ctr"/>
             <a:r>
-              <a:rPr lang="es-CO" dirty="0"/>
-              <a:t>Comprobación de Normalidad	</a:t>
+              <a:rPr lang="es-CO" sz="1400" dirty="0"/>
+              <a:t>Dom</a:t>
             </a:r>
           </a:p>
         </p:txBody>
@@ -12813,7 +13290,7 @@
     </p:spTree>
     <p:extLst>
       <p:ext uri="{BB962C8B-B14F-4D97-AF65-F5344CB8AC3E}">
-        <p14:creationId xmlns:p14="http://schemas.microsoft.com/office/powerpoint/2010/main" val="1855293373"/>
+        <p14:creationId xmlns:p14="http://schemas.microsoft.com/office/powerpoint/2010/main" val="3774959094"/>
       </p:ext>
     </p:extLst>
   </p:cSld>
@@ -12840,36 +13317,6 @@
           <a:chExt cx="0" cy="0"/>
         </a:xfrm>
       </p:grpSpPr>
-      <p:pic>
-        <p:nvPicPr>
-          <p:cNvPr id="14" name="Picture 13">
-            <a:extLst>
-              <a:ext uri="{FF2B5EF4-FFF2-40B4-BE49-F238E27FC236}">
-                <a16:creationId xmlns:a16="http://schemas.microsoft.com/office/drawing/2014/main" id="{A46CF639-65E5-4AA8-A337-01F7DC8881B1}"/>
-              </a:ext>
-            </a:extLst>
-          </p:cNvPr>
-          <p:cNvPicPr>
-            <a:picLocks noChangeAspect="1"/>
-          </p:cNvPicPr>
-          <p:nvPr/>
-        </p:nvPicPr>
-        <p:blipFill>
-          <a:blip r:embed="rId3"/>
-          <a:stretch>
-            <a:fillRect/>
-          </a:stretch>
-        </p:blipFill>
-        <p:spPr>
-          <a:xfrm>
-            <a:off x="624366" y="852146"/>
-            <a:ext cx="10943268" cy="4740051"/>
-          </a:xfrm>
-          <a:prstGeom prst="rect">
-            <a:avLst/>
-          </a:prstGeom>
-        </p:spPr>
-      </p:pic>
       <p:sp>
         <p:nvSpPr>
           <p:cNvPr id="27" name="TextBox 26">
@@ -12923,7 +13370,7 @@
             </a:r>
             <a:r>
               <a:rPr lang="es-CO" dirty="0"/>
-              <a:t> se calculo la función de densidad y se comparó contra una Distribución Normal de Referencia.</a:t>
+              <a:t> se calculó la función de densidad y se comparó contra una Distribución Normal de Referencia.</a:t>
             </a:r>
           </a:p>
         </p:txBody>
@@ -12942,8 +13389,8 @@
         </p:nvGrpSpPr>
         <p:grpSpPr>
           <a:xfrm>
-            <a:off x="350969" y="6005854"/>
-            <a:ext cx="9117123" cy="409655"/>
+            <a:off x="296539" y="6005854"/>
+            <a:ext cx="9591677" cy="409655"/>
             <a:chOff x="2411184" y="6078230"/>
             <a:chExt cx="7175408" cy="409655"/>
           </a:xfrm>
@@ -13018,7 +13465,7 @@
           <p:spPr>
             <a:xfrm>
               <a:off x="2411184" y="6100001"/>
-              <a:ext cx="7175408" cy="369332"/>
+              <a:ext cx="7042129" cy="369332"/>
             </a:xfrm>
             <a:prstGeom prst="rect">
               <a:avLst/>
@@ -13042,7 +13489,7 @@
                     <a:srgbClr val="00B050"/>
                   </a:solidFill>
                 </a:rPr>
-                <a:t>PRIMER HALLAZGO : </a:t>
+                <a:t>HALLAZGO : </a:t>
               </a:r>
               <a:r>
                 <a:rPr lang="es-CO" dirty="0"/>
@@ -13110,7 +13557,7 @@
         </p:nvGrpSpPr>
         <p:grpSpPr>
           <a:xfrm>
-            <a:off x="9979137" y="5903770"/>
+            <a:off x="10055339" y="5903770"/>
             <a:ext cx="1861894" cy="606476"/>
             <a:chOff x="9329057" y="174524"/>
             <a:chExt cx="801667" cy="606476"/>
@@ -13303,6 +13750,36 @@
           </p:txBody>
         </p:sp>
       </p:grpSp>
+      <p:pic>
+        <p:nvPicPr>
+          <p:cNvPr id="2" name="Picture 1">
+            <a:extLst>
+              <a:ext uri="{FF2B5EF4-FFF2-40B4-BE49-F238E27FC236}">
+                <a16:creationId xmlns:a16="http://schemas.microsoft.com/office/drawing/2014/main" id="{D5397C42-F661-4CED-B9F7-0123E85A38F2}"/>
+              </a:ext>
+            </a:extLst>
+          </p:cNvPr>
+          <p:cNvPicPr>
+            <a:picLocks noChangeAspect="1"/>
+          </p:cNvPicPr>
+          <p:nvPr/>
+        </p:nvPicPr>
+        <p:blipFill>
+          <a:blip r:embed="rId3"/>
+          <a:stretch>
+            <a:fillRect/>
+          </a:stretch>
+        </p:blipFill>
+        <p:spPr>
+          <a:xfrm>
+            <a:off x="235291" y="764685"/>
+            <a:ext cx="11660170" cy="5074752"/>
+          </a:xfrm>
+          <a:prstGeom prst="rect">
+            <a:avLst/>
+          </a:prstGeom>
+        </p:spPr>
+      </p:pic>
     </p:spTree>
     <p:extLst>
       <p:ext uri="{BB962C8B-B14F-4D97-AF65-F5344CB8AC3E}">
@@ -13333,60 +13810,40 @@
           <a:chExt cx="0" cy="0"/>
         </a:xfrm>
       </p:grpSpPr>
-      <p:sp>
-        <p:nvSpPr>
-          <p:cNvPr id="2" name="Title 1">
+      <p:pic>
+        <p:nvPicPr>
+          <p:cNvPr id="4" name="Picture 3">
             <a:extLst>
               <a:ext uri="{FF2B5EF4-FFF2-40B4-BE49-F238E27FC236}">
-                <a16:creationId xmlns:a16="http://schemas.microsoft.com/office/drawing/2014/main" id="{1D331303-AC16-4D4D-BD5C-1535ACE3F122}"/>
+                <a16:creationId xmlns:a16="http://schemas.microsoft.com/office/drawing/2014/main" id="{E7EB83BE-53FF-4246-B8D2-60813366137D}"/>
               </a:ext>
             </a:extLst>
           </p:cNvPr>
-          <p:cNvSpPr>
-            <a:spLocks noGrp="1"/>
-          </p:cNvSpPr>
-          <p:nvPr>
-            <p:ph type="title"/>
-          </p:nvPr>
-        </p:nvSpPr>
-        <p:spPr/>
-        <p:txBody>
-          <a:bodyPr/>
-          <a:lstStyle/>
-          <a:p>
-            <a:endParaRPr lang="es-CO"/>
-          </a:p>
-        </p:txBody>
-      </p:sp>
-      <p:sp>
-        <p:nvSpPr>
-          <p:cNvPr id="3" name="Content Placeholder 2">
-            <a:extLst>
-              <a:ext uri="{FF2B5EF4-FFF2-40B4-BE49-F238E27FC236}">
-                <a16:creationId xmlns:a16="http://schemas.microsoft.com/office/drawing/2014/main" id="{FEE9C7A5-C5A8-4563-8679-3EE2EBE05BAD}"/>
-              </a:ext>
-            </a:extLst>
-          </p:cNvPr>
-          <p:cNvSpPr>
-            <a:spLocks noGrp="1"/>
-          </p:cNvSpPr>
-          <p:nvPr>
-            <p:ph idx="1"/>
-          </p:nvPr>
-        </p:nvSpPr>
-        <p:spPr/>
-        <p:txBody>
-          <a:bodyPr/>
-          <a:lstStyle/>
-          <a:p>
-            <a:endParaRPr lang="es-CO"/>
-          </a:p>
-        </p:txBody>
-      </p:sp>
+          <p:cNvPicPr>
+            <a:picLocks noChangeAspect="1"/>
+          </p:cNvPicPr>
+          <p:nvPr/>
+        </p:nvPicPr>
+        <p:blipFill>
+          <a:blip r:embed="rId3"/>
+          <a:stretch>
+            <a:fillRect/>
+          </a:stretch>
+        </p:blipFill>
+        <p:spPr>
+          <a:xfrm>
+            <a:off x="815419" y="112591"/>
+            <a:ext cx="10561162" cy="6658321"/>
+          </a:xfrm>
+          <a:prstGeom prst="rect">
+            <a:avLst/>
+          </a:prstGeom>
+        </p:spPr>
+      </p:pic>
     </p:spTree>
     <p:extLst>
       <p:ext uri="{BB962C8B-B14F-4D97-AF65-F5344CB8AC3E}">
-        <p14:creationId xmlns:p14="http://schemas.microsoft.com/office/powerpoint/2010/main" val="2404628323"/>
+        <p14:creationId xmlns:p14="http://schemas.microsoft.com/office/powerpoint/2010/main" val="2248788610"/>
       </p:ext>
     </p:extLst>
   </p:cSld>
@@ -13413,6 +13870,229 @@
           <a:chExt cx="0" cy="0"/>
         </a:xfrm>
       </p:grpSpPr>
+      <p:grpSp>
+        <p:nvGrpSpPr>
+          <p:cNvPr id="29" name="Group 28">
+            <a:extLst>
+              <a:ext uri="{FF2B5EF4-FFF2-40B4-BE49-F238E27FC236}">
+                <a16:creationId xmlns:a16="http://schemas.microsoft.com/office/drawing/2014/main" id="{E14B2B39-ECE1-47F6-B66D-9DFBCD940712}"/>
+              </a:ext>
+            </a:extLst>
+          </p:cNvPr>
+          <p:cNvGrpSpPr/>
+          <p:nvPr/>
+        </p:nvGrpSpPr>
+        <p:grpSpPr>
+          <a:xfrm>
+            <a:off x="1306287" y="5976261"/>
+            <a:ext cx="10145486" cy="719470"/>
+            <a:chOff x="2411184" y="6078230"/>
+            <a:chExt cx="7175408" cy="668102"/>
+          </a:xfrm>
+        </p:grpSpPr>
+        <p:sp>
+          <p:nvSpPr>
+            <p:cNvPr id="31" name="Rectangle 30">
+              <a:extLst>
+                <a:ext uri="{FF2B5EF4-FFF2-40B4-BE49-F238E27FC236}">
+                  <a16:creationId xmlns:a16="http://schemas.microsoft.com/office/drawing/2014/main" id="{4BA342A2-6E34-448B-BEF6-E312A4854D1E}"/>
+                </a:ext>
+              </a:extLst>
+            </p:cNvPr>
+            <p:cNvSpPr/>
+            <p:nvPr/>
+          </p:nvSpPr>
+          <p:spPr>
+            <a:xfrm>
+              <a:off x="2411184" y="6078230"/>
+              <a:ext cx="7175408" cy="668102"/>
+            </a:xfrm>
+            <a:prstGeom prst="rect">
+              <a:avLst/>
+            </a:prstGeom>
+            <a:solidFill>
+              <a:schemeClr val="accent6">
+                <a:lumMod val="20000"/>
+                <a:lumOff val="80000"/>
+              </a:schemeClr>
+            </a:solidFill>
+            <a:ln>
+              <a:noFill/>
+            </a:ln>
+          </p:spPr>
+          <p:style>
+            <a:lnRef idx="2">
+              <a:schemeClr val="accent1">
+                <a:shade val="50000"/>
+              </a:schemeClr>
+            </a:lnRef>
+            <a:fillRef idx="1">
+              <a:schemeClr val="accent1"/>
+            </a:fillRef>
+            <a:effectRef idx="0">
+              <a:schemeClr val="accent1"/>
+            </a:effectRef>
+            <a:fontRef idx="minor">
+              <a:schemeClr val="lt1"/>
+            </a:fontRef>
+          </p:style>
+          <p:txBody>
+            <a:bodyPr rtlCol="0" anchor="ctr"/>
+            <a:lstStyle/>
+            <a:p>
+              <a:pPr algn="ctr"/>
+              <a:endParaRPr lang="es-CO" dirty="0"/>
+            </a:p>
+          </p:txBody>
+        </p:sp>
+        <p:sp>
+          <p:nvSpPr>
+            <p:cNvPr id="32" name="TextBox 31">
+              <a:extLst>
+                <a:ext uri="{FF2B5EF4-FFF2-40B4-BE49-F238E27FC236}">
+                  <a16:creationId xmlns:a16="http://schemas.microsoft.com/office/drawing/2014/main" id="{639401B4-E147-4A76-AF3E-E6291B52C777}"/>
+                </a:ext>
+              </a:extLst>
+            </p:cNvPr>
+            <p:cNvSpPr txBox="1"/>
+            <p:nvPr/>
+          </p:nvSpPr>
+          <p:spPr>
+            <a:xfrm>
+              <a:off x="2411184" y="6100001"/>
+              <a:ext cx="7042129" cy="600185"/>
+            </a:xfrm>
+            <a:prstGeom prst="rect">
+              <a:avLst/>
+            </a:prstGeom>
+            <a:noFill/>
+          </p:spPr>
+          <p:txBody>
+            <a:bodyPr wrap="square" rtlCol="0">
+              <a:spAutoFit/>
+            </a:bodyPr>
+            <a:lstStyle/>
+            <a:p>
+              <a:pPr>
+                <a:buClr>
+                  <a:srgbClr val="00B050"/>
+                </a:buClr>
+              </a:pPr>
+              <a:r>
+                <a:rPr lang="es-CO" b="1" dirty="0">
+                  <a:solidFill>
+                    <a:srgbClr val="00B050"/>
+                  </a:solidFill>
+                </a:rPr>
+                <a:t>HALLAZGO : </a:t>
+              </a:r>
+              <a:r>
+                <a:rPr lang="es-CO" dirty="0"/>
+                <a:t>Parece que hay entre 3 y 4 grupos de similitud con respecto a la salida de red acumulada diariamente.</a:t>
+              </a:r>
+            </a:p>
+          </p:txBody>
+        </p:sp>
+      </p:grpSp>
+      <p:sp>
+        <p:nvSpPr>
+          <p:cNvPr id="7" name="TextBox 6">
+            <a:extLst>
+              <a:ext uri="{FF2B5EF4-FFF2-40B4-BE49-F238E27FC236}">
+                <a16:creationId xmlns:a16="http://schemas.microsoft.com/office/drawing/2014/main" id="{0F536314-3C7A-419A-A519-318949C59B51}"/>
+              </a:ext>
+            </a:extLst>
+          </p:cNvPr>
+          <p:cNvSpPr txBox="1"/>
+          <p:nvPr/>
+        </p:nvSpPr>
+        <p:spPr>
+          <a:xfrm>
+            <a:off x="3929931" y="129538"/>
+            <a:ext cx="4709751" cy="369332"/>
+          </a:xfrm>
+          <a:prstGeom prst="rect">
+            <a:avLst/>
+          </a:prstGeom>
+          <a:noFill/>
+        </p:spPr>
+        <p:txBody>
+          <a:bodyPr wrap="none" rtlCol="0">
+            <a:spAutoFit/>
+          </a:bodyPr>
+          <a:lstStyle/>
+          <a:p>
+            <a:r>
+              <a:rPr lang="es-CO" b="1" dirty="0" err="1"/>
+              <a:t>Dendrograma</a:t>
+            </a:r>
+            <a:r>
+              <a:rPr lang="es-CO" b="1" dirty="0"/>
+              <a:t> de las agrupaciones encontradas </a:t>
+            </a:r>
+          </a:p>
+        </p:txBody>
+      </p:sp>
+      <p:pic>
+        <p:nvPicPr>
+          <p:cNvPr id="4" name="Picture 3">
+            <a:extLst>
+              <a:ext uri="{FF2B5EF4-FFF2-40B4-BE49-F238E27FC236}">
+                <a16:creationId xmlns:a16="http://schemas.microsoft.com/office/drawing/2014/main" id="{36A989AF-2B64-404B-8FA6-3F03A1B6005C}"/>
+              </a:ext>
+            </a:extLst>
+          </p:cNvPr>
+          <p:cNvPicPr>
+            <a:picLocks noChangeAspect="1"/>
+          </p:cNvPicPr>
+          <p:nvPr/>
+        </p:nvPicPr>
+        <p:blipFill>
+          <a:blip r:embed="rId3"/>
+          <a:stretch>
+            <a:fillRect/>
+          </a:stretch>
+        </p:blipFill>
+        <p:spPr>
+          <a:xfrm>
+            <a:off x="612935" y="498870"/>
+            <a:ext cx="10966130" cy="5403048"/>
+          </a:xfrm>
+          <a:prstGeom prst="rect">
+            <a:avLst/>
+          </a:prstGeom>
+        </p:spPr>
+      </p:pic>
+    </p:spTree>
+    <p:extLst>
+      <p:ext uri="{BB962C8B-B14F-4D97-AF65-F5344CB8AC3E}">
+        <p14:creationId xmlns:p14="http://schemas.microsoft.com/office/powerpoint/2010/main" val="1184348199"/>
+      </p:ext>
+    </p:extLst>
+  </p:cSld>
+  <p:clrMapOvr>
+    <a:masterClrMapping/>
+  </p:clrMapOvr>
+</p:sld>
+</file>
+
+<file path=ppt/slides/slide9.xml><?xml version="1.0" encoding="utf-8"?>
+<p:sld xmlns:a="http://schemas.openxmlformats.org/drawingml/2006/main" xmlns:r="http://schemas.openxmlformats.org/officeDocument/2006/relationships" xmlns:p="http://schemas.openxmlformats.org/presentationml/2006/main">
+  <p:cSld>
+    <p:spTree>
+      <p:nvGrpSpPr>
+        <p:cNvPr id="1" name=""/>
+        <p:cNvGrpSpPr/>
+        <p:nvPr/>
+      </p:nvGrpSpPr>
+      <p:grpSpPr>
+        <a:xfrm>
+          <a:off x="0" y="0"/>
+          <a:ext cx="0" cy="0"/>
+          <a:chOff x="0" y="0"/>
+          <a:chExt cx="0" cy="0"/>
+        </a:xfrm>
+      </p:grpSpPr>
       <p:sp>
         <p:nvSpPr>
           <p:cNvPr id="4" name="Title 3">
@@ -13431,7 +14111,7 @@
         </p:nvSpPr>
         <p:spPr>
           <a:xfrm>
-            <a:off x="1187613" y="2764971"/>
+            <a:off x="1318242" y="620485"/>
             <a:ext cx="8825657" cy="880294"/>
           </a:xfrm>
         </p:spPr>
@@ -13452,6 +14132,90 @@
           </a:p>
         </p:txBody>
       </p:sp>
+      <p:sp>
+        <p:nvSpPr>
+          <p:cNvPr id="2" name="TextBox 1">
+            <a:extLst>
+              <a:ext uri="{FF2B5EF4-FFF2-40B4-BE49-F238E27FC236}">
+                <a16:creationId xmlns:a16="http://schemas.microsoft.com/office/drawing/2014/main" id="{89074A49-47EA-41F3-93AA-4B1B9D31B7D0}"/>
+              </a:ext>
+            </a:extLst>
+          </p:cNvPr>
+          <p:cNvSpPr txBox="1"/>
+          <p:nvPr/>
+        </p:nvSpPr>
+        <p:spPr>
+          <a:xfrm>
+            <a:off x="587828" y="1828801"/>
+            <a:ext cx="10490372" cy="1815882"/>
+          </a:xfrm>
+          <a:prstGeom prst="rect">
+            <a:avLst/>
+          </a:prstGeom>
+          <a:noFill/>
+        </p:spPr>
+        <p:txBody>
+          <a:bodyPr wrap="none" rtlCol="0">
+            <a:spAutoFit/>
+          </a:bodyPr>
+          <a:lstStyle/>
+          <a:p>
+            <a:r>
+              <a:rPr lang="en-US" sz="2800" dirty="0"/>
+              <a:t>Puede acceder al c</a:t>
+            </a:r>
+            <a:r>
+              <a:rPr lang="es-CO" sz="2800" dirty="0"/>
+              <a:t>ódigo y datos de este experimento en:</a:t>
+            </a:r>
+          </a:p>
+          <a:p>
+            <a:endParaRPr lang="es-CO" sz="2800" dirty="0"/>
+          </a:p>
+          <a:p>
+            <a:r>
+              <a:rPr lang="es-CO" sz="2800" dirty="0">
+                <a:hlinkClick r:id="rId2"/>
+              </a:rPr>
+              <a:t>https://cutt.ly/GS1</a:t>
+            </a:r>
+            <a:endParaRPr lang="es-CO" sz="2800" dirty="0"/>
+          </a:p>
+          <a:p>
+            <a:endParaRPr lang="es-CO" sz="2800" dirty="0"/>
+          </a:p>
+        </p:txBody>
+      </p:sp>
+      <p:pic>
+        <p:nvPicPr>
+          <p:cNvPr id="5" name="Picture 4">
+            <a:extLst>
+              <a:ext uri="{FF2B5EF4-FFF2-40B4-BE49-F238E27FC236}">
+                <a16:creationId xmlns:a16="http://schemas.microsoft.com/office/drawing/2014/main" id="{967C41CC-53E3-4DA3-9B03-624C013A409E}"/>
+              </a:ext>
+            </a:extLst>
+          </p:cNvPr>
+          <p:cNvPicPr>
+            <a:picLocks noChangeAspect="1"/>
+          </p:cNvPicPr>
+          <p:nvPr/>
+        </p:nvPicPr>
+        <p:blipFill>
+          <a:blip r:embed="rId3"/>
+          <a:stretch>
+            <a:fillRect/>
+          </a:stretch>
+        </p:blipFill>
+        <p:spPr>
+          <a:xfrm>
+            <a:off x="9191241" y="3769064"/>
+            <a:ext cx="2583404" cy="2629128"/>
+          </a:xfrm>
+          <a:prstGeom prst="rect">
+            <a:avLst/>
+          </a:prstGeom>
+        </p:spPr>
+      </p:pic>
     </p:spTree>
     <p:extLst>
       <p:ext uri="{BB962C8B-B14F-4D97-AF65-F5344CB8AC3E}">

</xml_diff>

<commit_message>
Ajustes para agregar nuevas empresas completando la informacion con promedios cuando son menos de 2 dias
</commit_message>
<xml_diff>
--- a/CloudLocation/CloudLocation-Presentacion.pptx
+++ b/CloudLocation/CloudLocation-Presentacion.pptx
@@ -206,7 +206,7 @@
           <a:p>
             <a:fld id="{B4C60D65-DF38-455A-AA78-F3029E1BF5B9}" type="datetimeFigureOut">
               <a:rPr lang="es-CO" smtClean="0"/>
-              <a:t>30/10/2019</a:t>
+              <a:t>31/10/2019</a:t>
             </a:fld>
             <a:endParaRPr lang="es-CO"/>
           </a:p>
@@ -644,7 +644,7 @@
             </a:r>
             <a:r>
               <a:rPr lang="es-CO" dirty="0"/>
-              <a:t>, estos se reducen a 41 pues algunos despliegues cuentan con muy pocos datos por tener </a:t>
+              <a:t>, estos se reducen a 46 pues algunos despliegues cuentan con muy pocos datos por tener </a:t>
             </a:r>
             <a:r>
               <a:rPr lang="es-CO" dirty="0" err="1"/>
@@ -1339,7 +1339,7 @@
           <a:p>
             <a:fld id="{408A00D0-160B-420F-90FC-08235F816E7C}" type="datetimeFigureOut">
               <a:rPr lang="es-CO" smtClean="0"/>
-              <a:t>30/10/2019</a:t>
+              <a:t>31/10/2019</a:t>
             </a:fld>
             <a:endParaRPr lang="es-CO"/>
           </a:p>
@@ -1614,7 +1614,7 @@
           <a:p>
             <a:fld id="{408A00D0-160B-420F-90FC-08235F816E7C}" type="datetimeFigureOut">
               <a:rPr lang="es-CO" smtClean="0"/>
-              <a:t>30/10/2019</a:t>
+              <a:t>31/10/2019</a:t>
             </a:fld>
             <a:endParaRPr lang="es-CO"/>
           </a:p>
@@ -1808,7 +1808,7 @@
           <a:p>
             <a:fld id="{408A00D0-160B-420F-90FC-08235F816E7C}" type="datetimeFigureOut">
               <a:rPr lang="es-CO" smtClean="0"/>
-              <a:t>30/10/2019</a:t>
+              <a:t>31/10/2019</a:t>
             </a:fld>
             <a:endParaRPr lang="es-CO"/>
           </a:p>
@@ -2076,7 +2076,7 @@
           <a:p>
             <a:fld id="{408A00D0-160B-420F-90FC-08235F816E7C}" type="datetimeFigureOut">
               <a:rPr lang="es-CO" smtClean="0"/>
-              <a:t>30/10/2019</a:t>
+              <a:t>31/10/2019</a:t>
             </a:fld>
             <a:endParaRPr lang="es-CO"/>
           </a:p>
@@ -2408,7 +2408,7 @@
           <a:p>
             <a:fld id="{408A00D0-160B-420F-90FC-08235F816E7C}" type="datetimeFigureOut">
               <a:rPr lang="es-CO" smtClean="0"/>
-              <a:t>30/10/2019</a:t>
+              <a:t>31/10/2019</a:t>
             </a:fld>
             <a:endParaRPr lang="es-CO"/>
           </a:p>
@@ -3018,7 +3018,7 @@
           <a:p>
             <a:fld id="{408A00D0-160B-420F-90FC-08235F816E7C}" type="datetimeFigureOut">
               <a:rPr lang="es-CO" smtClean="0"/>
-              <a:t>30/10/2019</a:t>
+              <a:t>31/10/2019</a:t>
             </a:fld>
             <a:endParaRPr lang="es-CO"/>
           </a:p>
@@ -3865,7 +3865,7 @@
           <a:p>
             <a:fld id="{408A00D0-160B-420F-90FC-08235F816E7C}" type="datetimeFigureOut">
               <a:rPr lang="es-CO" smtClean="0"/>
-              <a:t>30/10/2019</a:t>
+              <a:t>31/10/2019</a:t>
             </a:fld>
             <a:endParaRPr lang="es-CO"/>
           </a:p>
@@ -4035,7 +4035,7 @@
           <a:p>
             <a:fld id="{408A00D0-160B-420F-90FC-08235F816E7C}" type="datetimeFigureOut">
               <a:rPr lang="es-CO" smtClean="0"/>
-              <a:t>30/10/2019</a:t>
+              <a:t>31/10/2019</a:t>
             </a:fld>
             <a:endParaRPr lang="es-CO"/>
           </a:p>
@@ -4215,7 +4215,7 @@
           <a:p>
             <a:fld id="{408A00D0-160B-420F-90FC-08235F816E7C}" type="datetimeFigureOut">
               <a:rPr lang="es-CO" smtClean="0"/>
-              <a:t>30/10/2019</a:t>
+              <a:t>31/10/2019</a:t>
             </a:fld>
             <a:endParaRPr lang="es-CO"/>
           </a:p>
@@ -4407,7 +4407,7 @@
           <a:p>
             <a:fld id="{408A00D0-160B-420F-90FC-08235F816E7C}" type="datetimeFigureOut">
               <a:rPr lang="es-CO" smtClean="0"/>
-              <a:t>30/10/2019</a:t>
+              <a:t>31/10/2019</a:t>
             </a:fld>
             <a:endParaRPr lang="es-CO"/>
           </a:p>
@@ -4577,7 +4577,7 @@
           <a:p>
             <a:fld id="{408A00D0-160B-420F-90FC-08235F816E7C}" type="datetimeFigureOut">
               <a:rPr lang="es-CO" smtClean="0"/>
-              <a:t>30/10/2019</a:t>
+              <a:t>31/10/2019</a:t>
             </a:fld>
             <a:endParaRPr lang="es-CO"/>
           </a:p>
@@ -4747,7 +4747,7 @@
           <a:p>
             <a:fld id="{408A00D0-160B-420F-90FC-08235F816E7C}" type="datetimeFigureOut">
               <a:rPr lang="es-CO" smtClean="0"/>
-              <a:t>30/10/2019</a:t>
+              <a:t>31/10/2019</a:t>
             </a:fld>
             <a:endParaRPr lang="es-CO"/>
           </a:p>
@@ -4993,7 +4993,7 @@
           <a:p>
             <a:fld id="{408A00D0-160B-420F-90FC-08235F816E7C}" type="datetimeFigureOut">
               <a:rPr lang="es-CO" smtClean="0"/>
-              <a:t>30/10/2019</a:t>
+              <a:t>31/10/2019</a:t>
             </a:fld>
             <a:endParaRPr lang="es-CO"/>
           </a:p>
@@ -5225,7 +5225,7 @@
           <a:p>
             <a:fld id="{408A00D0-160B-420F-90FC-08235F816E7C}" type="datetimeFigureOut">
               <a:rPr lang="es-CO" smtClean="0"/>
-              <a:t>30/10/2019</a:t>
+              <a:t>31/10/2019</a:t>
             </a:fld>
             <a:endParaRPr lang="es-CO"/>
           </a:p>
@@ -5592,7 +5592,7 @@
           <a:p>
             <a:fld id="{408A00D0-160B-420F-90FC-08235F816E7C}" type="datetimeFigureOut">
               <a:rPr lang="es-CO" smtClean="0"/>
-              <a:t>30/10/2019</a:t>
+              <a:t>31/10/2019</a:t>
             </a:fld>
             <a:endParaRPr lang="es-CO"/>
           </a:p>
@@ -5710,7 +5710,7 @@
           <a:p>
             <a:fld id="{408A00D0-160B-420F-90FC-08235F816E7C}" type="datetimeFigureOut">
               <a:rPr lang="es-CO" smtClean="0"/>
-              <a:t>30/10/2019</a:t>
+              <a:t>31/10/2019</a:t>
             </a:fld>
             <a:endParaRPr lang="es-CO"/>
           </a:p>
@@ -5805,7 +5805,7 @@
           <a:p>
             <a:fld id="{408A00D0-160B-420F-90FC-08235F816E7C}" type="datetimeFigureOut">
               <a:rPr lang="es-CO" smtClean="0"/>
-              <a:t>30/10/2019</a:t>
+              <a:t>31/10/2019</a:t>
             </a:fld>
             <a:endParaRPr lang="es-CO"/>
           </a:p>
@@ -6082,7 +6082,7 @@
           <a:p>
             <a:fld id="{408A00D0-160B-420F-90FC-08235F816E7C}" type="datetimeFigureOut">
               <a:rPr lang="es-CO" smtClean="0"/>
-              <a:t>30/10/2019</a:t>
+              <a:t>31/10/2019</a:t>
             </a:fld>
             <a:endParaRPr lang="es-CO"/>
           </a:p>
@@ -6339,7 +6339,7 @@
           <a:p>
             <a:fld id="{408A00D0-160B-420F-90FC-08235F816E7C}" type="datetimeFigureOut">
               <a:rPr lang="es-CO" smtClean="0"/>
-              <a:t>30/10/2019</a:t>
+              <a:t>31/10/2019</a:t>
             </a:fld>
             <a:endParaRPr lang="es-CO"/>
           </a:p>
@@ -6509,7 +6509,7 @@
           <a:p>
             <a:fld id="{408A00D0-160B-420F-90FC-08235F816E7C}" type="datetimeFigureOut">
               <a:rPr lang="es-CO" smtClean="0"/>
-              <a:t>30/10/2019</a:t>
+              <a:t>31/10/2019</a:t>
             </a:fld>
             <a:endParaRPr lang="es-CO"/>
           </a:p>
@@ -6689,7 +6689,7 @@
           <a:p>
             <a:fld id="{408A00D0-160B-420F-90FC-08235F816E7C}" type="datetimeFigureOut">
               <a:rPr lang="es-CO" smtClean="0"/>
-              <a:t>30/10/2019</a:t>
+              <a:t>31/10/2019</a:t>
             </a:fld>
             <a:endParaRPr lang="es-CO"/>
           </a:p>
@@ -6933,7 +6933,7 @@
           <a:p>
             <a:fld id="{408A00D0-160B-420F-90FC-08235F816E7C}" type="datetimeFigureOut">
               <a:rPr lang="es-CO" smtClean="0"/>
-              <a:t>30/10/2019</a:t>
+              <a:t>31/10/2019</a:t>
             </a:fld>
             <a:endParaRPr lang="es-CO"/>
           </a:p>
@@ -7225,7 +7225,7 @@
           <a:p>
             <a:fld id="{408A00D0-160B-420F-90FC-08235F816E7C}" type="datetimeFigureOut">
               <a:rPr lang="es-CO" smtClean="0"/>
-              <a:t>30/10/2019</a:t>
+              <a:t>31/10/2019</a:t>
             </a:fld>
             <a:endParaRPr lang="es-CO"/>
           </a:p>
@@ -7663,7 +7663,7 @@
           <a:p>
             <a:fld id="{408A00D0-160B-420F-90FC-08235F816E7C}" type="datetimeFigureOut">
               <a:rPr lang="es-CO" smtClean="0"/>
-              <a:t>30/10/2019</a:t>
+              <a:t>31/10/2019</a:t>
             </a:fld>
             <a:endParaRPr lang="es-CO"/>
           </a:p>
@@ -7781,7 +7781,7 @@
           <a:p>
             <a:fld id="{408A00D0-160B-420F-90FC-08235F816E7C}" type="datetimeFigureOut">
               <a:rPr lang="es-CO" smtClean="0"/>
-              <a:t>30/10/2019</a:t>
+              <a:t>31/10/2019</a:t>
             </a:fld>
             <a:endParaRPr lang="es-CO"/>
           </a:p>
@@ -7876,7 +7876,7 @@
           <a:p>
             <a:fld id="{408A00D0-160B-420F-90FC-08235F816E7C}" type="datetimeFigureOut">
               <a:rPr lang="es-CO" smtClean="0"/>
-              <a:t>30/10/2019</a:t>
+              <a:t>31/10/2019</a:t>
             </a:fld>
             <a:endParaRPr lang="es-CO"/>
           </a:p>
@@ -8155,7 +8155,7 @@
           <a:p>
             <a:fld id="{408A00D0-160B-420F-90FC-08235F816E7C}" type="datetimeFigureOut">
               <a:rPr lang="es-CO" smtClean="0"/>
-              <a:t>30/10/2019</a:t>
+              <a:t>31/10/2019</a:t>
             </a:fld>
             <a:endParaRPr lang="es-CO"/>
           </a:p>
@@ -8430,7 +8430,7 @@
           <a:p>
             <a:fld id="{408A00D0-160B-420F-90FC-08235F816E7C}" type="datetimeFigureOut">
               <a:rPr lang="es-CO" smtClean="0"/>
-              <a:t>30/10/2019</a:t>
+              <a:t>31/10/2019</a:t>
             </a:fld>
             <a:endParaRPr lang="es-CO"/>
           </a:p>
@@ -8859,7 +8859,7 @@
           <a:p>
             <a:fld id="{408A00D0-160B-420F-90FC-08235F816E7C}" type="datetimeFigureOut">
               <a:rPr lang="es-CO" smtClean="0"/>
-              <a:t>30/10/2019</a:t>
+              <a:t>31/10/2019</a:t>
             </a:fld>
             <a:endParaRPr lang="es-CO"/>
           </a:p>
@@ -9495,7 +9495,7 @@
           <a:p>
             <a:fld id="{408A00D0-160B-420F-90FC-08235F816E7C}" type="datetimeFigureOut">
               <a:rPr lang="es-CO" smtClean="0"/>
-              <a:t>30/10/2019</a:t>
+              <a:t>31/10/2019</a:t>
             </a:fld>
             <a:endParaRPr lang="es-CO"/>
           </a:p>
@@ -12256,7 +12256,7 @@
                   <a:schemeClr val="bg1"/>
                 </a:solidFill>
               </a:rPr>
-              <a:t>41 </a:t>
+              <a:t>46 </a:t>
             </a:r>
             <a:r>
               <a:rPr lang="es-CO" dirty="0" err="1">
@@ -13812,10 +13812,10 @@
       </p:grpSpPr>
       <p:pic>
         <p:nvPicPr>
-          <p:cNvPr id="4" name="Picture 3">
+          <p:cNvPr id="2" name="Picture 1">
             <a:extLst>
               <a:ext uri="{FF2B5EF4-FFF2-40B4-BE49-F238E27FC236}">
-                <a16:creationId xmlns:a16="http://schemas.microsoft.com/office/drawing/2014/main" id="{E7EB83BE-53FF-4246-B8D2-60813366137D}"/>
+                <a16:creationId xmlns:a16="http://schemas.microsoft.com/office/drawing/2014/main" id="{3B69CC4B-DA52-4DA2-935B-405A1706B29C}"/>
               </a:ext>
             </a:extLst>
           </p:cNvPr>
@@ -13832,8 +13832,38 @@
         </p:blipFill>
         <p:spPr>
           <a:xfrm>
-            <a:off x="815419" y="112591"/>
-            <a:ext cx="10561162" cy="6658321"/>
+            <a:off x="825003" y="230928"/>
+            <a:ext cx="10541994" cy="6548544"/>
+          </a:xfrm>
+          <a:prstGeom prst="rect">
+            <a:avLst/>
+          </a:prstGeom>
+        </p:spPr>
+      </p:pic>
+      <p:pic>
+        <p:nvPicPr>
+          <p:cNvPr id="3" name="Picture 2">
+            <a:extLst>
+              <a:ext uri="{FF2B5EF4-FFF2-40B4-BE49-F238E27FC236}">
+                <a16:creationId xmlns:a16="http://schemas.microsoft.com/office/drawing/2014/main" id="{2F76699C-8B08-4790-9105-C2792570BEC7}"/>
+              </a:ext>
+            </a:extLst>
+          </p:cNvPr>
+          <p:cNvPicPr>
+            <a:picLocks noChangeAspect="1"/>
+          </p:cNvPicPr>
+          <p:nvPr/>
+        </p:nvPicPr>
+        <p:blipFill>
+          <a:blip r:embed="rId4"/>
+          <a:stretch>
+            <a:fillRect/>
+          </a:stretch>
+        </p:blipFill>
+        <p:spPr>
+          <a:xfrm>
+            <a:off x="7287585" y="2550928"/>
+            <a:ext cx="4610500" cy="3193057"/>
           </a:xfrm>
           <a:prstGeom prst="rect">
             <a:avLst/>
@@ -13850,6 +13880,81 @@
   <p:clrMapOvr>
     <a:masterClrMapping/>
   </p:clrMapOvr>
+  <p:timing>
+    <p:tnLst>
+      <p:par>
+        <p:cTn id="1" dur="indefinite" restart="never" nodeType="tmRoot">
+          <p:childTnLst>
+            <p:seq concurrent="1" nextAc="seek">
+              <p:cTn id="2" dur="indefinite" nodeType="mainSeq">
+                <p:childTnLst>
+                  <p:par>
+                    <p:cTn id="3" fill="hold">
+                      <p:stCondLst>
+                        <p:cond delay="indefinite"/>
+                      </p:stCondLst>
+                      <p:childTnLst>
+                        <p:par>
+                          <p:cTn id="4" fill="hold">
+                            <p:stCondLst>
+                              <p:cond delay="0"/>
+                            </p:stCondLst>
+                            <p:childTnLst>
+                              <p:par>
+                                <p:cTn id="5" presetID="1" presetClass="entr" presetSubtype="0" fill="hold" nodeType="clickEffect">
+                                  <p:stCondLst>
+                                    <p:cond delay="0"/>
+                                  </p:stCondLst>
+                                  <p:childTnLst>
+                                    <p:set>
+                                      <p:cBhvr>
+                                        <p:cTn id="6" dur="1" fill="hold">
+                                          <p:stCondLst>
+                                            <p:cond delay="0"/>
+                                          </p:stCondLst>
+                                        </p:cTn>
+                                        <p:tgtEl>
+                                          <p:spTgt spid="3"/>
+                                        </p:tgtEl>
+                                        <p:attrNameLst>
+                                          <p:attrName>style.visibility</p:attrName>
+                                        </p:attrNameLst>
+                                      </p:cBhvr>
+                                      <p:to>
+                                        <p:strVal val="visible"/>
+                                      </p:to>
+                                    </p:set>
+                                  </p:childTnLst>
+                                </p:cTn>
+                              </p:par>
+                            </p:childTnLst>
+                          </p:cTn>
+                        </p:par>
+                      </p:childTnLst>
+                    </p:cTn>
+                  </p:par>
+                </p:childTnLst>
+              </p:cTn>
+              <p:prevCondLst>
+                <p:cond evt="onPrev" delay="0">
+                  <p:tgtEl>
+                    <p:sldTgt/>
+                  </p:tgtEl>
+                </p:cond>
+              </p:prevCondLst>
+              <p:nextCondLst>
+                <p:cond evt="onNext" delay="0">
+                  <p:tgtEl>
+                    <p:sldTgt/>
+                  </p:tgtEl>
+                </p:cond>
+              </p:nextCondLst>
+            </p:seq>
+          </p:childTnLst>
+        </p:cTn>
+      </p:par>
+    </p:tnLst>
+  </p:timing>
 </p:sld>
 </file>
 
@@ -14035,10 +14140,10 @@
       </p:sp>
       <p:pic>
         <p:nvPicPr>
-          <p:cNvPr id="4" name="Picture 3">
+          <p:cNvPr id="2" name="Picture 1">
             <a:extLst>
               <a:ext uri="{FF2B5EF4-FFF2-40B4-BE49-F238E27FC236}">
-                <a16:creationId xmlns:a16="http://schemas.microsoft.com/office/drawing/2014/main" id="{36A989AF-2B64-404B-8FA6-3F03A1B6005C}"/>
+                <a16:creationId xmlns:a16="http://schemas.microsoft.com/office/drawing/2014/main" id="{95B2E6A0-1E7C-4A40-A77A-B5A5469B466C}"/>
               </a:ext>
             </a:extLst>
           </p:cNvPr>
@@ -14055,8 +14160,8 @@
         </p:blipFill>
         <p:spPr>
           <a:xfrm>
-            <a:off x="612935" y="498870"/>
-            <a:ext cx="10966130" cy="5403048"/>
+            <a:off x="299671" y="498870"/>
+            <a:ext cx="11592658" cy="5500836"/>
           </a:xfrm>
           <a:prstGeom prst="rect">
             <a:avLst/>

</xml_diff>